<commit_message>
2des pwbe crud completo
</commit_message>
<xml_diff>
--- a/2des/pwbe/aula03/Tutorial CRUD – MVC – JAVA WEB.pptx
+++ b/2des/pwbe/aula03/Tutorial CRUD – MVC – JAVA WEB.pptx
@@ -17,6 +17,11 @@
     <p:sldId id="265" r:id="rId11"/>
     <p:sldId id="266" r:id="rId12"/>
     <p:sldId id="267" r:id="rId13"/>
+    <p:sldId id="269" r:id="rId14"/>
+    <p:sldId id="268" r:id="rId15"/>
+    <p:sldId id="270" r:id="rId16"/>
+    <p:sldId id="271" r:id="rId17"/>
+    <p:sldId id="272" r:id="rId18"/>
   </p:sldIdLst>
   <p:sldSz cx="12192000" cy="6858000"/>
   <p:notesSz cx="6858000" cy="9144000"/>
@@ -254,7 +259,7 @@
           <a:p>
             <a:fld id="{6F859575-C097-4E9C-832F-24CEBF28EC82}" type="datetimeFigureOut">
               <a:rPr lang="pt-BR" smtClean="0"/>
-              <a:t>13/08/2021</a:t>
+              <a:t>18/08/2021</a:t>
             </a:fld>
             <a:endParaRPr lang="pt-BR"/>
           </a:p>
@@ -424,7 +429,7 @@
           <a:p>
             <a:fld id="{6F859575-C097-4E9C-832F-24CEBF28EC82}" type="datetimeFigureOut">
               <a:rPr lang="pt-BR" smtClean="0"/>
-              <a:t>13/08/2021</a:t>
+              <a:t>18/08/2021</a:t>
             </a:fld>
             <a:endParaRPr lang="pt-BR"/>
           </a:p>
@@ -604,7 +609,7 @@
           <a:p>
             <a:fld id="{6F859575-C097-4E9C-832F-24CEBF28EC82}" type="datetimeFigureOut">
               <a:rPr lang="pt-BR" smtClean="0"/>
-              <a:t>13/08/2021</a:t>
+              <a:t>18/08/2021</a:t>
             </a:fld>
             <a:endParaRPr lang="pt-BR"/>
           </a:p>
@@ -774,7 +779,7 @@
           <a:p>
             <a:fld id="{6F859575-C097-4E9C-832F-24CEBF28EC82}" type="datetimeFigureOut">
               <a:rPr lang="pt-BR" smtClean="0"/>
-              <a:t>13/08/2021</a:t>
+              <a:t>18/08/2021</a:t>
             </a:fld>
             <a:endParaRPr lang="pt-BR"/>
           </a:p>
@@ -1020,7 +1025,7 @@
           <a:p>
             <a:fld id="{6F859575-C097-4E9C-832F-24CEBF28EC82}" type="datetimeFigureOut">
               <a:rPr lang="pt-BR" smtClean="0"/>
-              <a:t>13/08/2021</a:t>
+              <a:t>18/08/2021</a:t>
             </a:fld>
             <a:endParaRPr lang="pt-BR"/>
           </a:p>
@@ -1252,7 +1257,7 @@
           <a:p>
             <a:fld id="{6F859575-C097-4E9C-832F-24CEBF28EC82}" type="datetimeFigureOut">
               <a:rPr lang="pt-BR" smtClean="0"/>
-              <a:t>13/08/2021</a:t>
+              <a:t>18/08/2021</a:t>
             </a:fld>
             <a:endParaRPr lang="pt-BR"/>
           </a:p>
@@ -1619,7 +1624,7 @@
           <a:p>
             <a:fld id="{6F859575-C097-4E9C-832F-24CEBF28EC82}" type="datetimeFigureOut">
               <a:rPr lang="pt-BR" smtClean="0"/>
-              <a:t>13/08/2021</a:t>
+              <a:t>18/08/2021</a:t>
             </a:fld>
             <a:endParaRPr lang="pt-BR"/>
           </a:p>
@@ -1737,7 +1742,7 @@
           <a:p>
             <a:fld id="{6F859575-C097-4E9C-832F-24CEBF28EC82}" type="datetimeFigureOut">
               <a:rPr lang="pt-BR" smtClean="0"/>
-              <a:t>13/08/2021</a:t>
+              <a:t>18/08/2021</a:t>
             </a:fld>
             <a:endParaRPr lang="pt-BR"/>
           </a:p>
@@ -1832,7 +1837,7 @@
           <a:p>
             <a:fld id="{6F859575-C097-4E9C-832F-24CEBF28EC82}" type="datetimeFigureOut">
               <a:rPr lang="pt-BR" smtClean="0"/>
-              <a:t>13/08/2021</a:t>
+              <a:t>18/08/2021</a:t>
             </a:fld>
             <a:endParaRPr lang="pt-BR"/>
           </a:p>
@@ -2109,7 +2114,7 @@
           <a:p>
             <a:fld id="{6F859575-C097-4E9C-832F-24CEBF28EC82}" type="datetimeFigureOut">
               <a:rPr lang="pt-BR" smtClean="0"/>
-              <a:t>13/08/2021</a:t>
+              <a:t>18/08/2021</a:t>
             </a:fld>
             <a:endParaRPr lang="pt-BR"/>
           </a:p>
@@ -2362,7 +2367,7 @@
           <a:p>
             <a:fld id="{6F859575-C097-4E9C-832F-24CEBF28EC82}" type="datetimeFigureOut">
               <a:rPr lang="pt-BR" smtClean="0"/>
-              <a:t>13/08/2021</a:t>
+              <a:t>18/08/2021</a:t>
             </a:fld>
             <a:endParaRPr lang="pt-BR"/>
           </a:p>
@@ -2575,7 +2580,7 @@
           <a:p>
             <a:fld id="{6F859575-C097-4E9C-832F-24CEBF28EC82}" type="datetimeFigureOut">
               <a:rPr lang="pt-BR" smtClean="0"/>
-              <a:t>13/08/2021</a:t>
+              <a:t>18/08/2021</a:t>
             </a:fld>
             <a:endParaRPr lang="pt-BR"/>
           </a:p>
@@ -3268,11 +3273,7 @@
           <a:p>
             <a:r>
               <a:rPr lang="pt-BR" dirty="0" smtClean="0"/>
-              <a:t>Agora JAVA Web (JSP</a:t>
-            </a:r>
-            <a:r>
-              <a:rPr lang="pt-BR" dirty="0" smtClean="0"/>
-              <a:t>) READ</a:t>
+              <a:t>Agora JAVA Web (JSP) READ</a:t>
             </a:r>
             <a:endParaRPr lang="pt-BR" dirty="0"/>
           </a:p>
@@ -3449,11 +3450,7 @@
           <a:p>
             <a:r>
               <a:rPr lang="pt-BR" sz="2200" dirty="0" smtClean="0"/>
-              <a:t>E execute seu </a:t>
-            </a:r>
-            <a:r>
-              <a:rPr lang="pt-BR" sz="2200" dirty="0" smtClean="0"/>
-              <a:t>projeto</a:t>
+              <a:t>E execute seu projeto</a:t>
             </a:r>
           </a:p>
           <a:p>
@@ -3538,15 +3535,7 @@
           <a:p>
             <a:r>
               <a:rPr lang="pt-BR" dirty="0" smtClean="0"/>
-              <a:t>JAVA </a:t>
-            </a:r>
-            <a:r>
-              <a:rPr lang="pt-BR" dirty="0" smtClean="0"/>
-              <a:t>Web (JSP</a:t>
-            </a:r>
-            <a:r>
-              <a:rPr lang="pt-BR" dirty="0" smtClean="0"/>
-              <a:t>) CREATE</a:t>
+              <a:t>JAVA Web (JSP) CREATE</a:t>
             </a:r>
             <a:endParaRPr lang="pt-BR" dirty="0"/>
           </a:p>
@@ -3606,11 +3595,7 @@
           <a:p>
             <a:r>
               <a:rPr lang="pt-BR" sz="2200" dirty="0" smtClean="0"/>
-              <a:t>Criar um formu</a:t>
-            </a:r>
-            <a:r>
-              <a:rPr lang="pt-BR" sz="2200" dirty="0" smtClean="0"/>
-              <a:t>lário HTML para enviar os dados</a:t>
+              <a:t>Criar um formulário HTML para enviar os dados</a:t>
             </a:r>
             <a:endParaRPr lang="pt-BR" sz="2200" dirty="0"/>
           </a:p>
@@ -3668,6 +3653,733 @@
     <p:extLst>
       <p:ext uri="{BB962C8B-B14F-4D97-AF65-F5344CB8AC3E}">
         <p14:creationId xmlns:p14="http://schemas.microsoft.com/office/powerpoint/2010/main" val="1390059094"/>
+      </p:ext>
+    </p:extLst>
+  </p:cSld>
+  <p:clrMapOvr>
+    <a:masterClrMapping/>
+  </p:clrMapOvr>
+</p:sld>
+</file>
+
+<file path=ppt/slides/slide13.xml><?xml version="1.0" encoding="utf-8"?>
+<p:sld xmlns:a="http://schemas.openxmlformats.org/drawingml/2006/main" xmlns:r="http://schemas.openxmlformats.org/officeDocument/2006/relationships" xmlns:p="http://schemas.openxmlformats.org/presentationml/2006/main">
+  <p:cSld>
+    <p:spTree>
+      <p:nvGrpSpPr>
+        <p:cNvPr id="1" name=""/>
+        <p:cNvGrpSpPr/>
+        <p:nvPr/>
+      </p:nvGrpSpPr>
+      <p:grpSpPr>
+        <a:xfrm>
+          <a:off x="0" y="0"/>
+          <a:ext cx="0" cy="0"/>
+          <a:chOff x="0" y="0"/>
+          <a:chExt cx="0" cy="0"/>
+        </a:xfrm>
+      </p:grpSpPr>
+      <p:sp>
+        <p:nvSpPr>
+          <p:cNvPr id="2" name="Título 1"/>
+          <p:cNvSpPr>
+            <a:spLocks noGrp="1"/>
+          </p:cNvSpPr>
+          <p:nvPr>
+            <p:ph type="title"/>
+          </p:nvPr>
+        </p:nvSpPr>
+        <p:spPr/>
+        <p:txBody>
+          <a:bodyPr/>
+          <a:lstStyle/>
+          <a:p>
+            <a:r>
+              <a:rPr lang="pt-BR" dirty="0" smtClean="0"/>
+              <a:t>JAVA Web (JSP) CREATE</a:t>
+            </a:r>
+            <a:endParaRPr lang="pt-BR" dirty="0"/>
+          </a:p>
+        </p:txBody>
+      </p:sp>
+      <p:sp>
+        <p:nvSpPr>
+          <p:cNvPr id="3" name="Espaço Reservado para Conteúdo 2"/>
+          <p:cNvSpPr>
+            <a:spLocks noGrp="1"/>
+          </p:cNvSpPr>
+          <p:nvPr>
+            <p:ph sz="half" idx="1"/>
+          </p:nvPr>
+        </p:nvSpPr>
+        <p:spPr>
+          <a:xfrm>
+            <a:off x="838200" y="1825625"/>
+            <a:ext cx="10414686" cy="2194440"/>
+          </a:xfrm>
+        </p:spPr>
+        <p:txBody>
+          <a:bodyPr>
+            <a:normAutofit/>
+          </a:bodyPr>
+          <a:lstStyle/>
+          <a:p>
+            <a:r>
+              <a:rPr lang="pt-BR" sz="2200" dirty="0" smtClean="0"/>
+              <a:t>Criar um código JSP para checar se </a:t>
+            </a:r>
+            <a:r>
+              <a:rPr lang="pt-BR" sz="2200" dirty="0" err="1" smtClean="0"/>
+              <a:t>chegarm</a:t>
+            </a:r>
+            <a:r>
+              <a:rPr lang="pt-BR" sz="2200" dirty="0" smtClean="0"/>
+              <a:t> dados via (POST ou GET)</a:t>
+            </a:r>
+            <a:endParaRPr lang="pt-BR" sz="2200" dirty="0" smtClean="0"/>
+          </a:p>
+          <a:p>
+            <a:r>
+              <a:rPr lang="pt-BR" sz="2200" dirty="0" smtClean="0"/>
+              <a:t>POST e GET são </a:t>
+            </a:r>
+            <a:r>
+              <a:rPr lang="pt-BR" sz="2200" b="1" dirty="0" smtClean="0"/>
+              <a:t>verbos</a:t>
+            </a:r>
+            <a:r>
+              <a:rPr lang="pt-BR" sz="2200" dirty="0" smtClean="0"/>
+              <a:t> HTTP que servem para estabelecer uma regra de solicitação e resposta</a:t>
+            </a:r>
+          </a:p>
+          <a:p>
+            <a:r>
+              <a:rPr lang="pt-BR" sz="2200" dirty="0" smtClean="0"/>
+              <a:t>Solicitações = </a:t>
+            </a:r>
+            <a:r>
+              <a:rPr lang="pt-BR" sz="2200" b="1" dirty="0" err="1" smtClean="0"/>
+              <a:t>request</a:t>
+            </a:r>
+            <a:r>
+              <a:rPr lang="pt-BR" sz="2200" dirty="0" smtClean="0"/>
+              <a:t> e Respostas = </a:t>
+            </a:r>
+            <a:r>
+              <a:rPr lang="pt-BR" sz="2200" b="1" dirty="0" smtClean="0"/>
+              <a:t>response</a:t>
+            </a:r>
+            <a:r>
+              <a:rPr lang="pt-BR" sz="2200" dirty="0" smtClean="0"/>
+              <a:t> (</a:t>
+            </a:r>
+            <a:r>
+              <a:rPr lang="pt-BR" sz="2200" dirty="0" err="1" smtClean="0"/>
+              <a:t>req</a:t>
+            </a:r>
+            <a:r>
+              <a:rPr lang="pt-BR" sz="2200" dirty="0" smtClean="0"/>
+              <a:t> e res)</a:t>
+            </a:r>
+          </a:p>
+          <a:p>
+            <a:r>
+              <a:rPr lang="pt-BR" sz="2200" dirty="0" smtClean="0"/>
+              <a:t>Em caso de mensagens (respostas) curtas temos “out” ou </a:t>
+            </a:r>
+            <a:r>
+              <a:rPr lang="pt-BR" sz="2200" dirty="0" err="1" smtClean="0"/>
+              <a:t>out.print</a:t>
+            </a:r>
+            <a:r>
+              <a:rPr lang="pt-BR" sz="2200" dirty="0" smtClean="0"/>
+              <a:t>() = JSP</a:t>
+            </a:r>
+            <a:endParaRPr lang="pt-BR" sz="2200" dirty="0"/>
+          </a:p>
+        </p:txBody>
+      </p:sp>
+      <p:pic>
+        <p:nvPicPr>
+          <p:cNvPr id="5" name="Imagem 4"/>
+          <p:cNvPicPr>
+            <a:picLocks noChangeAspect="1"/>
+          </p:cNvPicPr>
+          <p:nvPr/>
+        </p:nvPicPr>
+        <p:blipFill>
+          <a:blip r:embed="rId2"/>
+          <a:stretch>
+            <a:fillRect/>
+          </a:stretch>
+        </p:blipFill>
+        <p:spPr>
+          <a:xfrm>
+            <a:off x="935381" y="3789817"/>
+            <a:ext cx="5448944" cy="2555569"/>
+          </a:xfrm>
+          <a:prstGeom prst="rect">
+            <a:avLst/>
+          </a:prstGeom>
+        </p:spPr>
+      </p:pic>
+    </p:spTree>
+    <p:extLst>
+      <p:ext uri="{BB962C8B-B14F-4D97-AF65-F5344CB8AC3E}">
+        <p14:creationId xmlns:p14="http://schemas.microsoft.com/office/powerpoint/2010/main" val="1445153052"/>
+      </p:ext>
+    </p:extLst>
+  </p:cSld>
+  <p:clrMapOvr>
+    <a:masterClrMapping/>
+  </p:clrMapOvr>
+</p:sld>
+</file>
+
+<file path=ppt/slides/slide14.xml><?xml version="1.0" encoding="utf-8"?>
+<p:sld xmlns:a="http://schemas.openxmlformats.org/drawingml/2006/main" xmlns:r="http://schemas.openxmlformats.org/officeDocument/2006/relationships" xmlns:p="http://schemas.openxmlformats.org/presentationml/2006/main">
+  <p:cSld>
+    <p:spTree>
+      <p:nvGrpSpPr>
+        <p:cNvPr id="1" name=""/>
+        <p:cNvGrpSpPr/>
+        <p:nvPr/>
+      </p:nvGrpSpPr>
+      <p:grpSpPr>
+        <a:xfrm>
+          <a:off x="0" y="0"/>
+          <a:ext cx="0" cy="0"/>
+          <a:chOff x="0" y="0"/>
+          <a:chExt cx="0" cy="0"/>
+        </a:xfrm>
+      </p:grpSpPr>
+      <p:sp>
+        <p:nvSpPr>
+          <p:cNvPr id="2" name="Título 1"/>
+          <p:cNvSpPr>
+            <a:spLocks noGrp="1"/>
+          </p:cNvSpPr>
+          <p:nvPr>
+            <p:ph type="title"/>
+          </p:nvPr>
+        </p:nvSpPr>
+        <p:spPr/>
+        <p:txBody>
+          <a:bodyPr/>
+          <a:lstStyle/>
+          <a:p>
+            <a:r>
+              <a:rPr lang="pt-BR" dirty="0"/>
+              <a:t>JAVA Web (JSP) </a:t>
+            </a:r>
+            <a:r>
+              <a:rPr lang="pt-BR" dirty="0" smtClean="0"/>
+              <a:t>UPDATE e DELETE</a:t>
+            </a:r>
+            <a:endParaRPr lang="pt-BR" dirty="0"/>
+          </a:p>
+        </p:txBody>
+      </p:sp>
+      <p:sp>
+        <p:nvSpPr>
+          <p:cNvPr id="3" name="Espaço Reservado para Conteúdo 2"/>
+          <p:cNvSpPr>
+            <a:spLocks noGrp="1"/>
+          </p:cNvSpPr>
+          <p:nvPr>
+            <p:ph sz="half" idx="1"/>
+          </p:nvPr>
+        </p:nvSpPr>
+        <p:spPr/>
+        <p:txBody>
+          <a:bodyPr/>
+          <a:lstStyle/>
+          <a:p>
+            <a:r>
+              <a:rPr lang="pt-BR" dirty="0" smtClean="0"/>
+              <a:t>Neste tutorial, as paginas do </a:t>
+            </a:r>
+            <a:r>
+              <a:rPr lang="pt-BR" dirty="0" err="1" smtClean="0"/>
+              <a:t>crudo</a:t>
+            </a:r>
+            <a:r>
+              <a:rPr lang="pt-BR" dirty="0" smtClean="0"/>
+              <a:t> estão separadas para que possamos estudar os verbos HTTP e as requisições e respostas.</a:t>
+            </a:r>
+            <a:endParaRPr lang="pt-BR" dirty="0"/>
+          </a:p>
+        </p:txBody>
+      </p:sp>
+      <p:sp>
+        <p:nvSpPr>
+          <p:cNvPr id="4" name="Espaço Reservado para Conteúdo 3"/>
+          <p:cNvSpPr>
+            <a:spLocks noGrp="1"/>
+          </p:cNvSpPr>
+          <p:nvPr>
+            <p:ph sz="half" idx="2"/>
+          </p:nvPr>
+        </p:nvSpPr>
+        <p:spPr/>
+        <p:txBody>
+          <a:bodyPr/>
+          <a:lstStyle/>
+          <a:p>
+            <a:r>
+              <a:rPr lang="pt-BR" dirty="0" smtClean="0"/>
+              <a:t>Para isso faremos uma página JSP que servirá apenas para </a:t>
+            </a:r>
+            <a:r>
+              <a:rPr lang="pt-BR" b="1" dirty="0" smtClean="0"/>
+              <a:t>buscar</a:t>
+            </a:r>
+            <a:r>
+              <a:rPr lang="pt-BR" dirty="0" smtClean="0"/>
+              <a:t> os dados na </a:t>
+            </a:r>
+            <a:r>
+              <a:rPr lang="pt-BR" b="1" dirty="0" smtClean="0"/>
+              <a:t>lista</a:t>
+            </a:r>
+            <a:r>
+              <a:rPr lang="pt-BR" dirty="0" smtClean="0"/>
+              <a:t>.</a:t>
+            </a:r>
+          </a:p>
+          <a:p>
+            <a:pPr marL="0" indent="0">
+              <a:buNone/>
+            </a:pPr>
+            <a:r>
+              <a:rPr lang="pt-BR" b="1" dirty="0" smtClean="0"/>
+              <a:t>OBS</a:t>
+            </a:r>
+            <a:r>
+              <a:rPr lang="pt-BR" dirty="0" smtClean="0"/>
+              <a:t>: Servidores (Apache, </a:t>
+            </a:r>
+            <a:r>
+              <a:rPr lang="pt-BR" dirty="0" err="1" smtClean="0"/>
+              <a:t>TomCat</a:t>
+            </a:r>
+            <a:r>
+              <a:rPr lang="pt-BR" dirty="0" smtClean="0"/>
+              <a:t>, V8 do Node, IIS)</a:t>
+            </a:r>
+          </a:p>
+          <a:p>
+            <a:pPr marL="0" indent="0">
+              <a:buNone/>
+            </a:pPr>
+            <a:r>
+              <a:rPr lang="pt-BR" dirty="0" smtClean="0"/>
+              <a:t>Servidores de </a:t>
+            </a:r>
+            <a:r>
+              <a:rPr lang="pt-BR" dirty="0" err="1" smtClean="0"/>
+              <a:t>Middware</a:t>
+            </a:r>
+            <a:r>
+              <a:rPr lang="pt-BR" dirty="0" smtClean="0"/>
+              <a:t> “Meio de campo” em outras palavras </a:t>
+            </a:r>
+            <a:r>
+              <a:rPr lang="pt-BR" dirty="0" err="1" smtClean="0"/>
+              <a:t>BackEnd</a:t>
+            </a:r>
+            <a:r>
+              <a:rPr lang="pt-BR" dirty="0" smtClean="0"/>
+              <a:t>.</a:t>
+            </a:r>
+            <a:endParaRPr lang="pt-BR" dirty="0"/>
+          </a:p>
+        </p:txBody>
+      </p:sp>
+    </p:spTree>
+    <p:extLst>
+      <p:ext uri="{BB962C8B-B14F-4D97-AF65-F5344CB8AC3E}">
+        <p14:creationId xmlns:p14="http://schemas.microsoft.com/office/powerpoint/2010/main" val="934645607"/>
+      </p:ext>
+    </p:extLst>
+  </p:cSld>
+  <p:clrMapOvr>
+    <a:masterClrMapping/>
+  </p:clrMapOvr>
+</p:sld>
+</file>
+
+<file path=ppt/slides/slide15.xml><?xml version="1.0" encoding="utf-8"?>
+<p:sld xmlns:a="http://schemas.openxmlformats.org/drawingml/2006/main" xmlns:r="http://schemas.openxmlformats.org/officeDocument/2006/relationships" xmlns:p="http://schemas.openxmlformats.org/presentationml/2006/main">
+  <p:cSld>
+    <p:spTree>
+      <p:nvGrpSpPr>
+        <p:cNvPr id="1" name=""/>
+        <p:cNvGrpSpPr/>
+        <p:nvPr/>
+      </p:nvGrpSpPr>
+      <p:grpSpPr>
+        <a:xfrm>
+          <a:off x="0" y="0"/>
+          <a:ext cx="0" cy="0"/>
+          <a:chOff x="0" y="0"/>
+          <a:chExt cx="0" cy="0"/>
+        </a:xfrm>
+      </p:grpSpPr>
+      <p:sp>
+        <p:nvSpPr>
+          <p:cNvPr id="2" name="Título 1"/>
+          <p:cNvSpPr>
+            <a:spLocks noGrp="1"/>
+          </p:cNvSpPr>
+          <p:nvPr>
+            <p:ph type="title"/>
+          </p:nvPr>
+        </p:nvSpPr>
+        <p:spPr/>
+        <p:txBody>
+          <a:bodyPr/>
+          <a:lstStyle/>
+          <a:p>
+            <a:r>
+              <a:rPr lang="pt-BR" dirty="0"/>
+              <a:t>JAVA Web (JSP) </a:t>
+            </a:r>
+            <a:r>
+              <a:rPr lang="pt-BR" dirty="0" smtClean="0"/>
+              <a:t>UPDATE e DELETE</a:t>
+            </a:r>
+            <a:endParaRPr lang="pt-BR" dirty="0"/>
+          </a:p>
+        </p:txBody>
+      </p:sp>
+      <p:pic>
+        <p:nvPicPr>
+          <p:cNvPr id="7" name="Espaço Reservado para Conteúdo 6"/>
+          <p:cNvPicPr>
+            <a:picLocks noGrp="1" noChangeAspect="1"/>
+          </p:cNvPicPr>
+          <p:nvPr>
+            <p:ph sz="half" idx="1"/>
+          </p:nvPr>
+        </p:nvPicPr>
+        <p:blipFill>
+          <a:blip r:embed="rId2"/>
+          <a:stretch>
+            <a:fillRect/>
+          </a:stretch>
+        </p:blipFill>
+        <p:spPr>
+          <a:xfrm>
+            <a:off x="838200" y="2117609"/>
+            <a:ext cx="5181600" cy="3767369"/>
+          </a:xfrm>
+          <a:prstGeom prst="rect">
+            <a:avLst/>
+          </a:prstGeom>
+        </p:spPr>
+      </p:pic>
+      <p:pic>
+        <p:nvPicPr>
+          <p:cNvPr id="8" name="Imagem 7"/>
+          <p:cNvPicPr>
+            <a:picLocks noChangeAspect="1"/>
+          </p:cNvPicPr>
+          <p:nvPr/>
+        </p:nvPicPr>
+        <p:blipFill>
+          <a:blip r:embed="rId3"/>
+          <a:stretch>
+            <a:fillRect/>
+          </a:stretch>
+        </p:blipFill>
+        <p:spPr>
+          <a:xfrm>
+            <a:off x="6357937" y="3233351"/>
+            <a:ext cx="4352925" cy="1676400"/>
+          </a:xfrm>
+          <a:prstGeom prst="rect">
+            <a:avLst/>
+          </a:prstGeom>
+        </p:spPr>
+      </p:pic>
+    </p:spTree>
+    <p:extLst>
+      <p:ext uri="{BB962C8B-B14F-4D97-AF65-F5344CB8AC3E}">
+        <p14:creationId xmlns:p14="http://schemas.microsoft.com/office/powerpoint/2010/main" val="1942894894"/>
+      </p:ext>
+    </p:extLst>
+  </p:cSld>
+  <p:clrMapOvr>
+    <a:masterClrMapping/>
+  </p:clrMapOvr>
+</p:sld>
+</file>
+
+<file path=ppt/slides/slide16.xml><?xml version="1.0" encoding="utf-8"?>
+<p:sld xmlns:a="http://schemas.openxmlformats.org/drawingml/2006/main" xmlns:r="http://schemas.openxmlformats.org/officeDocument/2006/relationships" xmlns:p="http://schemas.openxmlformats.org/presentationml/2006/main">
+  <p:cSld>
+    <p:spTree>
+      <p:nvGrpSpPr>
+        <p:cNvPr id="1" name=""/>
+        <p:cNvGrpSpPr/>
+        <p:nvPr/>
+      </p:nvGrpSpPr>
+      <p:grpSpPr>
+        <a:xfrm>
+          <a:off x="0" y="0"/>
+          <a:ext cx="0" cy="0"/>
+          <a:chOff x="0" y="0"/>
+          <a:chExt cx="0" cy="0"/>
+        </a:xfrm>
+      </p:grpSpPr>
+      <p:sp>
+        <p:nvSpPr>
+          <p:cNvPr id="2" name="Título 1"/>
+          <p:cNvSpPr>
+            <a:spLocks noGrp="1"/>
+          </p:cNvSpPr>
+          <p:nvPr>
+            <p:ph type="title"/>
+          </p:nvPr>
+        </p:nvSpPr>
+        <p:spPr/>
+        <p:txBody>
+          <a:bodyPr/>
+          <a:lstStyle/>
+          <a:p>
+            <a:r>
+              <a:rPr lang="pt-BR" dirty="0"/>
+              <a:t>JAVA Web (JSP) </a:t>
+            </a:r>
+            <a:r>
+              <a:rPr lang="pt-BR" dirty="0" smtClean="0"/>
+              <a:t>UPDATE e DELETE</a:t>
+            </a:r>
+            <a:endParaRPr lang="pt-BR" dirty="0"/>
+          </a:p>
+        </p:txBody>
+      </p:sp>
+      <p:sp>
+        <p:nvSpPr>
+          <p:cNvPr id="3" name="Espaço Reservado para Conteúdo 2"/>
+          <p:cNvSpPr>
+            <a:spLocks noGrp="1"/>
+          </p:cNvSpPr>
+          <p:nvPr>
+            <p:ph sz="half" idx="1"/>
+          </p:nvPr>
+        </p:nvSpPr>
+        <p:spPr>
+          <a:xfrm>
+            <a:off x="1134762" y="1586728"/>
+            <a:ext cx="10219038" cy="917576"/>
+          </a:xfrm>
+        </p:spPr>
+        <p:txBody>
+          <a:bodyPr>
+            <a:normAutofit fontScale="77500" lnSpcReduction="20000"/>
+          </a:bodyPr>
+          <a:lstStyle/>
+          <a:p>
+            <a:r>
+              <a:rPr lang="pt-BR" dirty="0" smtClean="0"/>
+              <a:t>Criamos uma página </a:t>
+            </a:r>
+            <a:r>
+              <a:rPr lang="pt-BR" dirty="0" err="1" smtClean="0"/>
+              <a:t>alterar.jsp</a:t>
+            </a:r>
+            <a:endParaRPr lang="pt-BR" u="sng" dirty="0" smtClean="0"/>
+          </a:p>
+          <a:p>
+            <a:r>
+              <a:rPr lang="pt-BR" dirty="0" smtClean="0"/>
+              <a:t>E nela pegamos os dados vindos do buscar e montamos um formulário já </a:t>
+            </a:r>
+            <a:r>
+              <a:rPr lang="pt-BR" dirty="0" err="1" smtClean="0"/>
+              <a:t>preechido</a:t>
+            </a:r>
+            <a:endParaRPr lang="pt-BR" dirty="0"/>
+          </a:p>
+        </p:txBody>
+      </p:sp>
+      <p:pic>
+        <p:nvPicPr>
+          <p:cNvPr id="5" name="Imagem 4"/>
+          <p:cNvPicPr>
+            <a:picLocks noChangeAspect="1"/>
+          </p:cNvPicPr>
+          <p:nvPr/>
+        </p:nvPicPr>
+        <p:blipFill>
+          <a:blip r:embed="rId2"/>
+          <a:stretch>
+            <a:fillRect/>
+          </a:stretch>
+        </p:blipFill>
+        <p:spPr>
+          <a:xfrm>
+            <a:off x="1049871" y="2747535"/>
+            <a:ext cx="6640021" cy="3526994"/>
+          </a:xfrm>
+          <a:prstGeom prst="rect">
+            <a:avLst/>
+          </a:prstGeom>
+        </p:spPr>
+      </p:pic>
+      <p:pic>
+        <p:nvPicPr>
+          <p:cNvPr id="6" name="Imagem 5"/>
+          <p:cNvPicPr>
+            <a:picLocks noChangeAspect="1"/>
+          </p:cNvPicPr>
+          <p:nvPr/>
+        </p:nvPicPr>
+        <p:blipFill>
+          <a:blip r:embed="rId3"/>
+          <a:stretch>
+            <a:fillRect/>
+          </a:stretch>
+        </p:blipFill>
+        <p:spPr>
+          <a:xfrm>
+            <a:off x="7689892" y="2672277"/>
+            <a:ext cx="3315601" cy="2278999"/>
+          </a:xfrm>
+          <a:prstGeom prst="rect">
+            <a:avLst/>
+          </a:prstGeom>
+        </p:spPr>
+      </p:pic>
+    </p:spTree>
+    <p:extLst>
+      <p:ext uri="{BB962C8B-B14F-4D97-AF65-F5344CB8AC3E}">
+        <p14:creationId xmlns:p14="http://schemas.microsoft.com/office/powerpoint/2010/main" val="333783107"/>
+      </p:ext>
+    </p:extLst>
+  </p:cSld>
+  <p:clrMapOvr>
+    <a:masterClrMapping/>
+  </p:clrMapOvr>
+</p:sld>
+</file>
+
+<file path=ppt/slides/slide17.xml><?xml version="1.0" encoding="utf-8"?>
+<p:sld xmlns:a="http://schemas.openxmlformats.org/drawingml/2006/main" xmlns:r="http://schemas.openxmlformats.org/officeDocument/2006/relationships" xmlns:p="http://schemas.openxmlformats.org/presentationml/2006/main">
+  <p:cSld>
+    <p:spTree>
+      <p:nvGrpSpPr>
+        <p:cNvPr id="1" name=""/>
+        <p:cNvGrpSpPr/>
+        <p:nvPr/>
+      </p:nvGrpSpPr>
+      <p:grpSpPr>
+        <a:xfrm>
+          <a:off x="0" y="0"/>
+          <a:ext cx="0" cy="0"/>
+          <a:chOff x="0" y="0"/>
+          <a:chExt cx="0" cy="0"/>
+        </a:xfrm>
+      </p:grpSpPr>
+      <p:sp>
+        <p:nvSpPr>
+          <p:cNvPr id="2" name="Título 1"/>
+          <p:cNvSpPr>
+            <a:spLocks noGrp="1"/>
+          </p:cNvSpPr>
+          <p:nvPr>
+            <p:ph type="title"/>
+          </p:nvPr>
+        </p:nvSpPr>
+        <p:spPr/>
+        <p:txBody>
+          <a:bodyPr/>
+          <a:lstStyle/>
+          <a:p>
+            <a:r>
+              <a:rPr lang="pt-BR" dirty="0"/>
+              <a:t>JAVA Web (JSP) </a:t>
+            </a:r>
+            <a:r>
+              <a:rPr lang="pt-BR" dirty="0" smtClean="0"/>
+              <a:t>UPDATE e DELETE</a:t>
+            </a:r>
+            <a:endParaRPr lang="pt-BR" dirty="0"/>
+          </a:p>
+        </p:txBody>
+      </p:sp>
+      <p:sp>
+        <p:nvSpPr>
+          <p:cNvPr id="3" name="Espaço Reservado para Conteúdo 2"/>
+          <p:cNvSpPr>
+            <a:spLocks noGrp="1"/>
+          </p:cNvSpPr>
+          <p:nvPr>
+            <p:ph sz="half" idx="1"/>
+          </p:nvPr>
+        </p:nvSpPr>
+        <p:spPr>
+          <a:xfrm>
+            <a:off x="1134762" y="1586728"/>
+            <a:ext cx="10219038" cy="917576"/>
+          </a:xfrm>
+        </p:spPr>
+        <p:txBody>
+          <a:bodyPr>
+            <a:normAutofit/>
+          </a:bodyPr>
+          <a:lstStyle/>
+          <a:p>
+            <a:r>
+              <a:rPr lang="pt-BR" dirty="0" smtClean="0"/>
+              <a:t>Agora é só processar a opção que os dados chegaram (Excluir ou Alterar)</a:t>
+            </a:r>
+            <a:r>
+              <a:rPr lang="pt-BR" u="sng" dirty="0" smtClean="0"/>
+              <a:t> </a:t>
+            </a:r>
+            <a:r>
+              <a:rPr lang="pt-BR" dirty="0"/>
+              <a:t> </a:t>
+            </a:r>
+            <a:r>
+              <a:rPr lang="pt-BR" dirty="0" smtClean="0"/>
+              <a:t>com JSP. (switch case)</a:t>
+            </a:r>
+            <a:endParaRPr lang="pt-BR" dirty="0"/>
+          </a:p>
+        </p:txBody>
+      </p:sp>
+      <p:pic>
+        <p:nvPicPr>
+          <p:cNvPr id="7" name="Imagem 6"/>
+          <p:cNvPicPr>
+            <a:picLocks noChangeAspect="1"/>
+          </p:cNvPicPr>
+          <p:nvPr/>
+        </p:nvPicPr>
+        <p:blipFill>
+          <a:blip r:embed="rId2"/>
+          <a:stretch>
+            <a:fillRect/>
+          </a:stretch>
+        </p:blipFill>
+        <p:spPr>
+          <a:xfrm>
+            <a:off x="3606114" y="2504304"/>
+            <a:ext cx="5276334" cy="4223195"/>
+          </a:xfrm>
+          <a:prstGeom prst="rect">
+            <a:avLst/>
+          </a:prstGeom>
+        </p:spPr>
+      </p:pic>
+    </p:spTree>
+    <p:extLst>
+      <p:ext uri="{BB962C8B-B14F-4D97-AF65-F5344CB8AC3E}">
+        <p14:creationId xmlns:p14="http://schemas.microsoft.com/office/powerpoint/2010/main" val="3282784013"/>
       </p:ext>
     </p:extLst>
   </p:cSld>

</xml_diff>